<commit_message>
Changes in the detailed documentation after Mara comments
</commit_message>
<xml_diff>
--- a/docs/figures/LePHARE.pptx
+++ b/docs/figures/LePHARE.pptx
@@ -260,7 +260,7 @@
           <a:p>
             <a:fld id="{ECE5499A-6D0D-7642-B8EB-C6EEF080301D}" type="datetimeFigureOut">
               <a:rPr lang="fr-FR" smtClean="0"/>
-              <a:t>07/11/2024</a:t>
+              <a:t>14/11/2024</a:t>
             </a:fld>
             <a:endParaRPr lang="fr-FR"/>
           </a:p>
@@ -458,7 +458,7 @@
           <a:p>
             <a:fld id="{ECE5499A-6D0D-7642-B8EB-C6EEF080301D}" type="datetimeFigureOut">
               <a:rPr lang="fr-FR" smtClean="0"/>
-              <a:t>07/11/2024</a:t>
+              <a:t>14/11/2024</a:t>
             </a:fld>
             <a:endParaRPr lang="fr-FR"/>
           </a:p>
@@ -666,7 +666,7 @@
           <a:p>
             <a:fld id="{ECE5499A-6D0D-7642-B8EB-C6EEF080301D}" type="datetimeFigureOut">
               <a:rPr lang="fr-FR" smtClean="0"/>
-              <a:t>07/11/2024</a:t>
+              <a:t>14/11/2024</a:t>
             </a:fld>
             <a:endParaRPr lang="fr-FR"/>
           </a:p>
@@ -864,7 +864,7 @@
           <a:p>
             <a:fld id="{ECE5499A-6D0D-7642-B8EB-C6EEF080301D}" type="datetimeFigureOut">
               <a:rPr lang="fr-FR" smtClean="0"/>
-              <a:t>07/11/2024</a:t>
+              <a:t>14/11/2024</a:t>
             </a:fld>
             <a:endParaRPr lang="fr-FR"/>
           </a:p>
@@ -1139,7 +1139,7 @@
           <a:p>
             <a:fld id="{ECE5499A-6D0D-7642-B8EB-C6EEF080301D}" type="datetimeFigureOut">
               <a:rPr lang="fr-FR" smtClean="0"/>
-              <a:t>07/11/2024</a:t>
+              <a:t>14/11/2024</a:t>
             </a:fld>
             <a:endParaRPr lang="fr-FR"/>
           </a:p>
@@ -1404,7 +1404,7 @@
           <a:p>
             <a:fld id="{ECE5499A-6D0D-7642-B8EB-C6EEF080301D}" type="datetimeFigureOut">
               <a:rPr lang="fr-FR" smtClean="0"/>
-              <a:t>07/11/2024</a:t>
+              <a:t>14/11/2024</a:t>
             </a:fld>
             <a:endParaRPr lang="fr-FR"/>
           </a:p>
@@ -1816,7 +1816,7 @@
           <a:p>
             <a:fld id="{ECE5499A-6D0D-7642-B8EB-C6EEF080301D}" type="datetimeFigureOut">
               <a:rPr lang="fr-FR" smtClean="0"/>
-              <a:t>07/11/2024</a:t>
+              <a:t>14/11/2024</a:t>
             </a:fld>
             <a:endParaRPr lang="fr-FR"/>
           </a:p>
@@ -1957,7 +1957,7 @@
           <a:p>
             <a:fld id="{ECE5499A-6D0D-7642-B8EB-C6EEF080301D}" type="datetimeFigureOut">
               <a:rPr lang="fr-FR" smtClean="0"/>
-              <a:t>07/11/2024</a:t>
+              <a:t>14/11/2024</a:t>
             </a:fld>
             <a:endParaRPr lang="fr-FR"/>
           </a:p>
@@ -2070,7 +2070,7 @@
           <a:p>
             <a:fld id="{ECE5499A-6D0D-7642-B8EB-C6EEF080301D}" type="datetimeFigureOut">
               <a:rPr lang="fr-FR" smtClean="0"/>
-              <a:t>07/11/2024</a:t>
+              <a:t>14/11/2024</a:t>
             </a:fld>
             <a:endParaRPr lang="fr-FR"/>
           </a:p>
@@ -2381,7 +2381,7 @@
           <a:p>
             <a:fld id="{ECE5499A-6D0D-7642-B8EB-C6EEF080301D}" type="datetimeFigureOut">
               <a:rPr lang="fr-FR" smtClean="0"/>
-              <a:t>07/11/2024</a:t>
+              <a:t>14/11/2024</a:t>
             </a:fld>
             <a:endParaRPr lang="fr-FR"/>
           </a:p>
@@ -2669,7 +2669,7 @@
           <a:p>
             <a:fld id="{ECE5499A-6D0D-7642-B8EB-C6EEF080301D}" type="datetimeFigureOut">
               <a:rPr lang="fr-FR" smtClean="0"/>
-              <a:t>07/11/2024</a:t>
+              <a:t>14/11/2024</a:t>
             </a:fld>
             <a:endParaRPr lang="fr-FR"/>
           </a:p>
@@ -2910,7 +2910,7 @@
           <a:p>
             <a:fld id="{ECE5499A-6D0D-7642-B8EB-C6EEF080301D}" type="datetimeFigureOut">
               <a:rPr lang="fr-FR" smtClean="0"/>
-              <a:t>07/11/2024</a:t>
+              <a:t>14/11/2024</a:t>
             </a:fld>
             <a:endParaRPr lang="fr-FR"/>
           </a:p>
@@ -4996,7 +4996,7 @@
         <p:spPr>
           <a:xfrm>
             <a:off x="157655" y="1403358"/>
-            <a:ext cx="11863552" cy="3074608"/>
+            <a:ext cx="11863552" cy="3064071"/>
           </a:xfrm>
           <a:prstGeom prst="rect">
             <a:avLst/>
@@ -5288,31 +5288,31 @@
             </a:pPr>
             <a:r>
               <a:rPr lang="fr-FR" sz="1400" dirty="0"/>
-              <a:t>Full clone of the LEPHARE-data repository (</a:t>
-            </a:r>
-            <a:r>
-              <a:rPr lang="fr-FR" sz="1400" dirty="0" err="1"/>
-              <a:t>github.com</a:t>
-            </a:r>
-            <a:r>
-              <a:rPr lang="fr-FR" sz="1400" dirty="0"/>
-              <a:t>/</a:t>
-            </a:r>
-            <a:r>
-              <a:rPr lang="fr-FR" sz="1400" dirty="0" err="1"/>
-              <a:t>lephare-photoz</a:t>
-            </a:r>
-            <a:r>
-              <a:rPr lang="fr-FR" sz="1400" dirty="0"/>
-              <a:t>/</a:t>
-            </a:r>
-            <a:r>
-              <a:rPr lang="fr-FR" sz="1400" dirty="0" err="1"/>
-              <a:t>lephare</a:t>
-            </a:r>
-            <a:r>
-              <a:rPr lang="fr-FR" sz="1400" dirty="0"/>
-              <a:t>-data)</a:t>
+              <a:t>Use the </a:t>
+            </a:r>
+            <a:r>
+              <a:rPr lang="fr-FR" sz="1400" i="1" dirty="0" err="1"/>
+              <a:t>data_retrieval</a:t>
+            </a:r>
+            <a:r>
+              <a:rPr lang="fr-FR" sz="1400" dirty="0"/>
+              <a:t> </a:t>
+            </a:r>
+            <a:r>
+              <a:rPr lang="fr-FR" sz="1400" dirty="0" err="1"/>
+              <a:t>function</a:t>
+            </a:r>
+            <a:r>
+              <a:rPr lang="fr-FR" sz="1400" dirty="0"/>
+              <a:t> </a:t>
+            </a:r>
+            <a:r>
+              <a:rPr lang="fr-FR" sz="1400" dirty="0" err="1"/>
+              <a:t>available</a:t>
+            </a:r>
+            <a:r>
+              <a:rPr lang="fr-FR" sz="1400" dirty="0"/>
+              <a:t> in the python interface</a:t>
             </a:r>
           </a:p>
           <a:p>
@@ -5322,31 +5322,31 @@
             </a:pPr>
             <a:r>
               <a:rPr lang="fr-FR" sz="1400" dirty="0"/>
-              <a:t>Use the </a:t>
-            </a:r>
-            <a:r>
-              <a:rPr lang="fr-FR" sz="1400" i="1" dirty="0" err="1"/>
-              <a:t>data_retrieval</a:t>
-            </a:r>
-            <a:r>
-              <a:rPr lang="fr-FR" sz="1400" dirty="0"/>
-              <a:t> </a:t>
-            </a:r>
-            <a:r>
-              <a:rPr lang="fr-FR" sz="1400" dirty="0" err="1"/>
-              <a:t>function</a:t>
-            </a:r>
-            <a:r>
-              <a:rPr lang="fr-FR" sz="1400" dirty="0"/>
-              <a:t> </a:t>
-            </a:r>
-            <a:r>
-              <a:rPr lang="fr-FR" sz="1400" dirty="0" err="1"/>
-              <a:t>available</a:t>
-            </a:r>
-            <a:r>
-              <a:rPr lang="fr-FR" sz="1400" dirty="0"/>
-              <a:t> in the python interface</a:t>
+              <a:t>Full clone of the LEPHARE-data repository (</a:t>
+            </a:r>
+            <a:r>
+              <a:rPr lang="fr-FR" sz="1400" dirty="0" err="1"/>
+              <a:t>github.com</a:t>
+            </a:r>
+            <a:r>
+              <a:rPr lang="fr-FR" sz="1400" dirty="0"/>
+              <a:t>/</a:t>
+            </a:r>
+            <a:r>
+              <a:rPr lang="fr-FR" sz="1400" dirty="0" err="1"/>
+              <a:t>lephare-photoz</a:t>
+            </a:r>
+            <a:r>
+              <a:rPr lang="fr-FR" sz="1400" dirty="0"/>
+              <a:t>/</a:t>
+            </a:r>
+            <a:r>
+              <a:rPr lang="fr-FR" sz="1400" dirty="0" err="1"/>
+              <a:t>lephare</a:t>
+            </a:r>
+            <a:r>
+              <a:rPr lang="fr-FR" sz="1400" dirty="0"/>
+              <a:t>-data)</a:t>
             </a:r>
           </a:p>
         </p:txBody>
@@ -5472,7 +5472,7 @@
         </p:nvSpPr>
         <p:spPr>
           <a:xfrm>
-            <a:off x="323174" y="3614507"/>
+            <a:off x="323174" y="3536450"/>
             <a:ext cx="9220219" cy="307777"/>
           </a:xfrm>
           <a:prstGeom prst="roundRect">
@@ -5552,7 +5552,7 @@
         </p:nvSpPr>
         <p:spPr>
           <a:xfrm>
-            <a:off x="323173" y="4079939"/>
+            <a:off x="323173" y="3968429"/>
             <a:ext cx="9220219" cy="307777"/>
           </a:xfrm>
           <a:prstGeom prst="roundRect">
@@ -6187,8 +6187,8 @@
         </p:nvSpPr>
         <p:spPr>
           <a:xfrm>
-            <a:off x="157655" y="202039"/>
-            <a:ext cx="11863552" cy="959498"/>
+            <a:off x="157655" y="575111"/>
+            <a:ext cx="11863552" cy="586426"/>
           </a:xfrm>
           <a:prstGeom prst="rect">
             <a:avLst/>
@@ -6241,7 +6241,7 @@
         </p:nvSpPr>
         <p:spPr>
           <a:xfrm>
-            <a:off x="323173" y="63580"/>
+            <a:off x="323173" y="353512"/>
             <a:ext cx="9703695" cy="377719"/>
           </a:xfrm>
           <a:prstGeom prst="roundRect">
@@ -6316,8 +6316,8 @@
         </p:nvSpPr>
         <p:spPr>
           <a:xfrm>
-            <a:off x="323172" y="522699"/>
-            <a:ext cx="9869213" cy="523220"/>
+            <a:off x="323172" y="756871"/>
+            <a:ext cx="9869213" cy="307777"/>
           </a:xfrm>
           <a:prstGeom prst="rect">
             <a:avLst/>
@@ -6348,7 +6348,7 @@
             </a:r>
             <a:r>
               <a:rPr lang="fr-FR" sz="1400" dirty="0"/>
-              <a:t> </a:t>
+              <a:t> default  </a:t>
             </a:r>
             <a:r>
               <a:rPr lang="fr-FR" sz="1400" i="1" dirty="0"/>
@@ -6356,99 +6356,25 @@
             </a:r>
             <a:r>
               <a:rPr lang="fr-FR" sz="1400" dirty="0"/>
-              <a:t>directory if </a:t>
-            </a:r>
-            <a:r>
-              <a:rPr lang="fr-FR" sz="1400" i="1" dirty="0" err="1"/>
+              <a:t>directory by *</a:t>
+            </a:r>
+            <a:r>
+              <a:rPr lang="fr-FR" sz="1400" dirty="0" err="1"/>
               <a:t>pip</a:t>
             </a:r>
             <a:r>
-              <a:rPr lang="fr-FR" sz="1400" i="1" dirty="0"/>
+              <a:rPr lang="fr-FR" sz="1400" dirty="0"/>
               <a:t> </a:t>
             </a:r>
             <a:r>
-              <a:rPr lang="fr-FR" sz="1400" i="1" dirty="0" err="1"/>
+              <a:rPr lang="fr-FR" sz="1400" dirty="0" err="1"/>
               <a:t>install</a:t>
             </a:r>
             <a:r>
-              <a:rPr lang="fr-FR" sz="1400" i="1" dirty="0"/>
-              <a:t> </a:t>
-            </a:r>
-            <a:r>
-              <a:rPr lang="fr-FR" sz="1400" i="1" dirty="0" err="1"/>
-              <a:t>lephare</a:t>
+              <a:rPr lang="fr-FR" sz="1400" dirty="0"/>
+              <a:t>*</a:t>
             </a:r>
             <a:endParaRPr lang="fr-FR" sz="1400" i="1" dirty="0"/>
-          </a:p>
-          <a:p>
-            <a:pPr marL="285750" indent="-285750">
-              <a:buFont typeface="Arial" panose="020B0604020202020204" pitchFamily="34" charset="0"/>
-              <a:buChar char="•"/>
-            </a:pPr>
-            <a:r>
-              <a:rPr lang="fr-FR" sz="1400" dirty="0" err="1"/>
-              <a:t>Stored</a:t>
-            </a:r>
-            <a:r>
-              <a:rPr lang="fr-FR" sz="1400" dirty="0"/>
-              <a:t> in </a:t>
-            </a:r>
-            <a:r>
-              <a:rPr lang="fr-FR" sz="1400" i="1" dirty="0"/>
-              <a:t>LEPHARE/bin</a:t>
-            </a:r>
-            <a:r>
-              <a:rPr lang="fr-FR" sz="1400" dirty="0"/>
-              <a:t> if </a:t>
-            </a:r>
-            <a:r>
-              <a:rPr lang="fr-FR" sz="1400" dirty="0" err="1"/>
-              <a:t>installed</a:t>
-            </a:r>
-            <a:r>
-              <a:rPr lang="fr-FR" sz="1400" dirty="0"/>
-              <a:t> in </a:t>
-            </a:r>
-            <a:r>
-              <a:rPr lang="fr-FR" sz="1400" dirty="0" err="1"/>
-              <a:t>developper</a:t>
-            </a:r>
-            <a:r>
-              <a:rPr lang="fr-FR" sz="1400" dirty="0"/>
-              <a:t> mode (</a:t>
-            </a:r>
-            <a:r>
-              <a:rPr lang="fr-FR" sz="1400" dirty="0" err="1"/>
-              <a:t>cloning</a:t>
-            </a:r>
-            <a:r>
-              <a:rPr lang="fr-FR" sz="1400" dirty="0"/>
-              <a:t> </a:t>
-            </a:r>
-            <a:r>
-              <a:rPr lang="fr-FR" sz="1400" dirty="0" err="1"/>
-              <a:t>github.com</a:t>
-            </a:r>
-            <a:r>
-              <a:rPr lang="fr-FR" sz="1400" dirty="0"/>
-              <a:t>/</a:t>
-            </a:r>
-            <a:r>
-              <a:rPr lang="fr-FR" sz="1400" dirty="0" err="1"/>
-              <a:t>lephare-photoz</a:t>
-            </a:r>
-            <a:r>
-              <a:rPr lang="fr-FR" sz="1400" dirty="0"/>
-              <a:t>/</a:t>
-            </a:r>
-            <a:r>
-              <a:rPr lang="fr-FR" sz="1400" dirty="0" err="1"/>
-              <a:t>lephare</a:t>
-            </a:r>
-            <a:r>
-              <a:rPr lang="fr-FR" sz="1400" dirty="0"/>
-              <a:t>)</a:t>
-            </a:r>
           </a:p>
         </p:txBody>
       </p:sp>

</xml_diff>

<commit_message>
Include comments from Mara and other changes from Olivier
</commit_message>
<xml_diff>
--- a/docs/figures/LePHARE.pptx
+++ b/docs/figures/LePHARE.pptx
@@ -260,7 +260,7 @@
           <a:p>
             <a:fld id="{ECE5499A-6D0D-7642-B8EB-C6EEF080301D}" type="datetimeFigureOut">
               <a:rPr lang="fr-FR" smtClean="0"/>
-              <a:t>14/11/2024</a:t>
+              <a:t>21/11/2024</a:t>
             </a:fld>
             <a:endParaRPr lang="fr-FR"/>
           </a:p>
@@ -458,7 +458,7 @@
           <a:p>
             <a:fld id="{ECE5499A-6D0D-7642-B8EB-C6EEF080301D}" type="datetimeFigureOut">
               <a:rPr lang="fr-FR" smtClean="0"/>
-              <a:t>14/11/2024</a:t>
+              <a:t>21/11/2024</a:t>
             </a:fld>
             <a:endParaRPr lang="fr-FR"/>
           </a:p>
@@ -666,7 +666,7 @@
           <a:p>
             <a:fld id="{ECE5499A-6D0D-7642-B8EB-C6EEF080301D}" type="datetimeFigureOut">
               <a:rPr lang="fr-FR" smtClean="0"/>
-              <a:t>14/11/2024</a:t>
+              <a:t>21/11/2024</a:t>
             </a:fld>
             <a:endParaRPr lang="fr-FR"/>
           </a:p>
@@ -864,7 +864,7 @@
           <a:p>
             <a:fld id="{ECE5499A-6D0D-7642-B8EB-C6EEF080301D}" type="datetimeFigureOut">
               <a:rPr lang="fr-FR" smtClean="0"/>
-              <a:t>14/11/2024</a:t>
+              <a:t>21/11/2024</a:t>
             </a:fld>
             <a:endParaRPr lang="fr-FR"/>
           </a:p>
@@ -1139,7 +1139,7 @@
           <a:p>
             <a:fld id="{ECE5499A-6D0D-7642-B8EB-C6EEF080301D}" type="datetimeFigureOut">
               <a:rPr lang="fr-FR" smtClean="0"/>
-              <a:t>14/11/2024</a:t>
+              <a:t>21/11/2024</a:t>
             </a:fld>
             <a:endParaRPr lang="fr-FR"/>
           </a:p>
@@ -1404,7 +1404,7 @@
           <a:p>
             <a:fld id="{ECE5499A-6D0D-7642-B8EB-C6EEF080301D}" type="datetimeFigureOut">
               <a:rPr lang="fr-FR" smtClean="0"/>
-              <a:t>14/11/2024</a:t>
+              <a:t>21/11/2024</a:t>
             </a:fld>
             <a:endParaRPr lang="fr-FR"/>
           </a:p>
@@ -1816,7 +1816,7 @@
           <a:p>
             <a:fld id="{ECE5499A-6D0D-7642-B8EB-C6EEF080301D}" type="datetimeFigureOut">
               <a:rPr lang="fr-FR" smtClean="0"/>
-              <a:t>14/11/2024</a:t>
+              <a:t>21/11/2024</a:t>
             </a:fld>
             <a:endParaRPr lang="fr-FR"/>
           </a:p>
@@ -1957,7 +1957,7 @@
           <a:p>
             <a:fld id="{ECE5499A-6D0D-7642-B8EB-C6EEF080301D}" type="datetimeFigureOut">
               <a:rPr lang="fr-FR" smtClean="0"/>
-              <a:t>14/11/2024</a:t>
+              <a:t>21/11/2024</a:t>
             </a:fld>
             <a:endParaRPr lang="fr-FR"/>
           </a:p>
@@ -2070,7 +2070,7 @@
           <a:p>
             <a:fld id="{ECE5499A-6D0D-7642-B8EB-C6EEF080301D}" type="datetimeFigureOut">
               <a:rPr lang="fr-FR" smtClean="0"/>
-              <a:t>14/11/2024</a:t>
+              <a:t>21/11/2024</a:t>
             </a:fld>
             <a:endParaRPr lang="fr-FR"/>
           </a:p>
@@ -2381,7 +2381,7 @@
           <a:p>
             <a:fld id="{ECE5499A-6D0D-7642-B8EB-C6EEF080301D}" type="datetimeFigureOut">
               <a:rPr lang="fr-FR" smtClean="0"/>
-              <a:t>14/11/2024</a:t>
+              <a:t>21/11/2024</a:t>
             </a:fld>
             <a:endParaRPr lang="fr-FR"/>
           </a:p>
@@ -2669,7 +2669,7 @@
           <a:p>
             <a:fld id="{ECE5499A-6D0D-7642-B8EB-C6EEF080301D}" type="datetimeFigureOut">
               <a:rPr lang="fr-FR" smtClean="0"/>
-              <a:t>14/11/2024</a:t>
+              <a:t>21/11/2024</a:t>
             </a:fld>
             <a:endParaRPr lang="fr-FR"/>
           </a:p>
@@ -2910,7 +2910,7 @@
           <a:p>
             <a:fld id="{ECE5499A-6D0D-7642-B8EB-C6EEF080301D}" type="datetimeFigureOut">
               <a:rPr lang="fr-FR" smtClean="0"/>
-              <a:t>14/11/2024</a:t>
+              <a:t>21/11/2024</a:t>
             </a:fld>
             <a:endParaRPr lang="fr-FR"/>
           </a:p>
@@ -5204,8 +5204,8 @@
         </p:nvSpPr>
         <p:spPr>
           <a:xfrm>
-            <a:off x="323174" y="1673569"/>
-            <a:ext cx="10741572" cy="954107"/>
+            <a:off x="323174" y="1751626"/>
+            <a:ext cx="10741572" cy="738664"/>
           </a:xfrm>
           <a:prstGeom prst="rect">
             <a:avLst/>
@@ -5244,41 +5244,7 @@
             </a:r>
             <a:r>
               <a:rPr lang="fr-FR" sz="1400" b="1" dirty="0"/>
-              <a:t> by the code.</a:t>
-            </a:r>
-          </a:p>
-          <a:p>
-            <a:r>
-              <a:rPr lang="fr-FR" sz="1400" dirty="0" err="1"/>
-              <a:t>Two</a:t>
-            </a:r>
-            <a:r>
-              <a:rPr lang="fr-FR" sz="1400" dirty="0"/>
-              <a:t> </a:t>
-            </a:r>
-            <a:r>
-              <a:rPr lang="fr-FR" sz="1400" dirty="0" err="1"/>
-              <a:t>ways</a:t>
-            </a:r>
-            <a:r>
-              <a:rPr lang="fr-FR" sz="1400" dirty="0"/>
-              <a:t> of </a:t>
-            </a:r>
-            <a:r>
-              <a:rPr lang="fr-FR" sz="1400" dirty="0" err="1"/>
-              <a:t>getting</a:t>
-            </a:r>
-            <a:r>
-              <a:rPr lang="fr-FR" sz="1400" dirty="0"/>
-              <a:t> </a:t>
-            </a:r>
-            <a:r>
-              <a:rPr lang="fr-FR" sz="1400" dirty="0" err="1"/>
-              <a:t>them</a:t>
-            </a:r>
-            <a:r>
-              <a:rPr lang="fr-FR" sz="1400" dirty="0"/>
-              <a:t>:</a:t>
+              <a:t> by the code</a:t>
             </a:r>
           </a:p>
           <a:p>
@@ -5288,31 +5254,31 @@
             </a:pPr>
             <a:r>
               <a:rPr lang="fr-FR" sz="1400" dirty="0"/>
-              <a:t>Use the </a:t>
-            </a:r>
-            <a:r>
-              <a:rPr lang="fr-FR" sz="1400" i="1" dirty="0" err="1"/>
-              <a:t>data_retrieval</a:t>
-            </a:r>
-            <a:r>
-              <a:rPr lang="fr-FR" sz="1400" dirty="0"/>
-              <a:t> </a:t>
-            </a:r>
-            <a:r>
-              <a:rPr lang="fr-FR" sz="1400" dirty="0" err="1"/>
-              <a:t>function</a:t>
-            </a:r>
-            <a:r>
-              <a:rPr lang="fr-FR" sz="1400" dirty="0"/>
-              <a:t> </a:t>
-            </a:r>
-            <a:r>
-              <a:rPr lang="fr-FR" sz="1400" dirty="0" err="1"/>
-              <a:t>available</a:t>
-            </a:r>
-            <a:r>
-              <a:rPr lang="fr-FR" sz="1400" dirty="0"/>
-              <a:t> in the python interface</a:t>
+              <a:t>Full clone of the LEPHARE-data repository (</a:t>
+            </a:r>
+            <a:r>
+              <a:rPr lang="fr-FR" sz="1400" dirty="0" err="1"/>
+              <a:t>github.com</a:t>
+            </a:r>
+            <a:r>
+              <a:rPr lang="fr-FR" sz="1400" dirty="0"/>
+              <a:t>/</a:t>
+            </a:r>
+            <a:r>
+              <a:rPr lang="fr-FR" sz="1400" dirty="0" err="1"/>
+              <a:t>lephare-photoz</a:t>
+            </a:r>
+            <a:r>
+              <a:rPr lang="fr-FR" sz="1400" dirty="0"/>
+              <a:t>/</a:t>
+            </a:r>
+            <a:r>
+              <a:rPr lang="fr-FR" sz="1400" dirty="0" err="1"/>
+              <a:t>lephare</a:t>
+            </a:r>
+            <a:r>
+              <a:rPr lang="fr-FR" sz="1400" dirty="0"/>
+              <a:t>-data)</a:t>
             </a:r>
           </a:p>
           <a:p>
@@ -5322,31 +5288,31 @@
             </a:pPr>
             <a:r>
               <a:rPr lang="fr-FR" sz="1400" dirty="0"/>
-              <a:t>Full clone of the LEPHARE-data repository (</a:t>
-            </a:r>
-            <a:r>
-              <a:rPr lang="fr-FR" sz="1400" dirty="0" err="1"/>
-              <a:t>github.com</a:t>
-            </a:r>
-            <a:r>
-              <a:rPr lang="fr-FR" sz="1400" dirty="0"/>
-              <a:t>/</a:t>
-            </a:r>
-            <a:r>
-              <a:rPr lang="fr-FR" sz="1400" dirty="0" err="1"/>
-              <a:t>lephare-photoz</a:t>
-            </a:r>
-            <a:r>
-              <a:rPr lang="fr-FR" sz="1400" dirty="0"/>
-              <a:t>/</a:t>
-            </a:r>
-            <a:r>
-              <a:rPr lang="fr-FR" sz="1400" dirty="0" err="1"/>
-              <a:t>lephare</a:t>
-            </a:r>
-            <a:r>
-              <a:rPr lang="fr-FR" sz="1400" dirty="0"/>
-              <a:t>-data)</a:t>
+              <a:t>Or use the </a:t>
+            </a:r>
+            <a:r>
+              <a:rPr lang="fr-FR" sz="1400" i="1" dirty="0" err="1"/>
+              <a:t>data_retrieval</a:t>
+            </a:r>
+            <a:r>
+              <a:rPr lang="fr-FR" sz="1400" dirty="0"/>
+              <a:t> </a:t>
+            </a:r>
+            <a:r>
+              <a:rPr lang="fr-FR" sz="1400" dirty="0" err="1"/>
+              <a:t>function</a:t>
+            </a:r>
+            <a:r>
+              <a:rPr lang="fr-FR" sz="1400" dirty="0"/>
+              <a:t> </a:t>
+            </a:r>
+            <a:r>
+              <a:rPr lang="fr-FR" sz="1400" dirty="0" err="1"/>
+              <a:t>available</a:t>
+            </a:r>
+            <a:r>
+              <a:rPr lang="fr-FR" sz="1400" dirty="0"/>
+              <a:t> in the python interface</a:t>
             </a:r>
           </a:p>
         </p:txBody>

</xml_diff>